<commit_message>
Update presentation with new NCV matching
</commit_message>
<xml_diff>
--- a/presentations/Update_2019-06-12.pptx
+++ b/presentations/Update_2019-06-12.pptx
@@ -10,18 +10,16 @@
     <p:sldId id="260" r:id="rId4"/>
     <p:sldId id="261" r:id="rId5"/>
     <p:sldId id="262" r:id="rId6"/>
-    <p:sldId id="264" r:id="rId7"/>
-    <p:sldId id="263" r:id="rId8"/>
-    <p:sldId id="265" r:id="rId9"/>
-    <p:sldId id="266" r:id="rId10"/>
-    <p:sldId id="267" r:id="rId11"/>
-    <p:sldId id="268" r:id="rId12"/>
-    <p:sldId id="269" r:id="rId13"/>
-    <p:sldId id="270" r:id="rId14"/>
-    <p:sldId id="271" r:id="rId15"/>
-    <p:sldId id="272" r:id="rId16"/>
-    <p:sldId id="258" r:id="rId17"/>
-    <p:sldId id="259" r:id="rId18"/>
+    <p:sldId id="265" r:id="rId7"/>
+    <p:sldId id="266" r:id="rId8"/>
+    <p:sldId id="267" r:id="rId9"/>
+    <p:sldId id="268" r:id="rId10"/>
+    <p:sldId id="269" r:id="rId11"/>
+    <p:sldId id="270" r:id="rId12"/>
+    <p:sldId id="271" r:id="rId13"/>
+    <p:sldId id="272" r:id="rId14"/>
+    <p:sldId id="258" r:id="rId15"/>
+    <p:sldId id="259" r:id="rId16"/>
   </p:sldIdLst>
   <p:sldSz cx="12192000" cy="6858000"/>
   <p:notesSz cx="6858000" cy="9144000"/>
@@ -120,6 +118,11 @@
       </a:defRPr>
     </a:lvl9pPr>
   </p:defaultTextStyle>
+  <p:extLst>
+    <p:ext uri="{EFAFB233-063F-42B5-8137-9DF3F51BA10A}">
+      <p15:sldGuideLst xmlns:p15="http://schemas.microsoft.com/office/powerpoint/2012/main"/>
+    </p:ext>
+  </p:extLst>
 </p:presentation>
 </file>
 
@@ -272,7 +275,7 @@
           <a:p>
             <a:fld id="{E7645487-47E7-426D-ABE3-F7B06940B163}" type="datetimeFigureOut">
               <a:rPr lang="en-AT" smtClean="0"/>
-              <a:t>12/06/2019</a:t>
+              <a:t>13/06/2019</a:t>
             </a:fld>
             <a:endParaRPr lang="en-AT"/>
           </a:p>
@@ -472,7 +475,7 @@
           <a:p>
             <a:fld id="{E7645487-47E7-426D-ABE3-F7B06940B163}" type="datetimeFigureOut">
               <a:rPr lang="en-AT" smtClean="0"/>
-              <a:t>12/06/2019</a:t>
+              <a:t>13/06/2019</a:t>
             </a:fld>
             <a:endParaRPr lang="en-AT"/>
           </a:p>
@@ -682,7 +685,7 @@
           <a:p>
             <a:fld id="{E7645487-47E7-426D-ABE3-F7B06940B163}" type="datetimeFigureOut">
               <a:rPr lang="en-AT" smtClean="0"/>
-              <a:t>12/06/2019</a:t>
+              <a:t>13/06/2019</a:t>
             </a:fld>
             <a:endParaRPr lang="en-AT"/>
           </a:p>
@@ -882,7 +885,7 @@
           <a:p>
             <a:fld id="{E7645487-47E7-426D-ABE3-F7B06940B163}" type="datetimeFigureOut">
               <a:rPr lang="en-AT" smtClean="0"/>
-              <a:t>12/06/2019</a:t>
+              <a:t>13/06/2019</a:t>
             </a:fld>
             <a:endParaRPr lang="en-AT"/>
           </a:p>
@@ -1158,7 +1161,7 @@
           <a:p>
             <a:fld id="{E7645487-47E7-426D-ABE3-F7B06940B163}" type="datetimeFigureOut">
               <a:rPr lang="en-AT" smtClean="0"/>
-              <a:t>12/06/2019</a:t>
+              <a:t>13/06/2019</a:t>
             </a:fld>
             <a:endParaRPr lang="en-AT"/>
           </a:p>
@@ -1426,7 +1429,7 @@
           <a:p>
             <a:fld id="{E7645487-47E7-426D-ABE3-F7B06940B163}" type="datetimeFigureOut">
               <a:rPr lang="en-AT" smtClean="0"/>
-              <a:t>12/06/2019</a:t>
+              <a:t>13/06/2019</a:t>
             </a:fld>
             <a:endParaRPr lang="en-AT"/>
           </a:p>
@@ -1841,7 +1844,7 @@
           <a:p>
             <a:fld id="{E7645487-47E7-426D-ABE3-F7B06940B163}" type="datetimeFigureOut">
               <a:rPr lang="en-AT" smtClean="0"/>
-              <a:t>12/06/2019</a:t>
+              <a:t>13/06/2019</a:t>
             </a:fld>
             <a:endParaRPr lang="en-AT"/>
           </a:p>
@@ -1983,7 +1986,7 @@
           <a:p>
             <a:fld id="{E7645487-47E7-426D-ABE3-F7B06940B163}" type="datetimeFigureOut">
               <a:rPr lang="en-AT" smtClean="0"/>
-              <a:t>12/06/2019</a:t>
+              <a:t>13/06/2019</a:t>
             </a:fld>
             <a:endParaRPr lang="en-AT"/>
           </a:p>
@@ -2096,7 +2099,7 @@
           <a:p>
             <a:fld id="{E7645487-47E7-426D-ABE3-F7B06940B163}" type="datetimeFigureOut">
               <a:rPr lang="en-AT" smtClean="0"/>
-              <a:t>12/06/2019</a:t>
+              <a:t>13/06/2019</a:t>
             </a:fld>
             <a:endParaRPr lang="en-AT"/>
           </a:p>
@@ -2409,7 +2412,7 @@
           <a:p>
             <a:fld id="{E7645487-47E7-426D-ABE3-F7B06940B163}" type="datetimeFigureOut">
               <a:rPr lang="en-AT" smtClean="0"/>
-              <a:t>12/06/2019</a:t>
+              <a:t>13/06/2019</a:t>
             </a:fld>
             <a:endParaRPr lang="en-AT"/>
           </a:p>
@@ -2698,7 +2701,7 @@
           <a:p>
             <a:fld id="{E7645487-47E7-426D-ABE3-F7B06940B163}" type="datetimeFigureOut">
               <a:rPr lang="en-AT" smtClean="0"/>
-              <a:t>12/06/2019</a:t>
+              <a:t>13/06/2019</a:t>
             </a:fld>
             <a:endParaRPr lang="en-AT"/>
           </a:p>
@@ -2941,7 +2944,7 @@
           <a:p>
             <a:fld id="{E7645487-47E7-426D-ABE3-F7B06940B163}" type="datetimeFigureOut">
               <a:rPr lang="en-AT" smtClean="0"/>
-              <a:t>12/06/2019</a:t>
+              <a:t>13/06/2019</a:t>
             </a:fld>
             <a:endParaRPr lang="en-AT"/>
           </a:p>
@@ -3496,348 +3499,6 @@
           <p:cNvPr id="2" name="Title 1">
             <a:extLst>
               <a:ext uri="{FF2B5EF4-FFF2-40B4-BE49-F238E27FC236}">
-                <a16:creationId xmlns:a16="http://schemas.microsoft.com/office/drawing/2014/main" id="{88E1C1A6-FE28-4763-B395-F7A572D92662}"/>
-              </a:ext>
-            </a:extLst>
-          </p:cNvPr>
-          <p:cNvSpPr>
-            <a:spLocks noGrp="1"/>
-          </p:cNvSpPr>
-          <p:nvPr>
-            <p:ph type="title"/>
-          </p:nvPr>
-        </p:nvSpPr>
-        <p:spPr/>
-        <p:txBody>
-          <a:bodyPr/>
-          <a:lstStyle/>
-          <a:p>
-            <a:r>
-              <a:rPr lang="en-US" dirty="0"/>
-              <a:t>Mapping shortest paths</a:t>
-            </a:r>
-            <a:endParaRPr lang="en-AT" dirty="0"/>
-          </a:p>
-        </p:txBody>
-      </p:sp>
-      <p:sp>
-        <p:nvSpPr>
-          <p:cNvPr id="3" name="Content Placeholder 2">
-            <a:extLst>
-              <a:ext uri="{FF2B5EF4-FFF2-40B4-BE49-F238E27FC236}">
-                <a16:creationId xmlns:a16="http://schemas.microsoft.com/office/drawing/2014/main" id="{DA5AD138-66C6-4FD8-9960-25CFA8A26CFC}"/>
-              </a:ext>
-            </a:extLst>
-          </p:cNvPr>
-          <p:cNvSpPr>
-            <a:spLocks noGrp="1"/>
-          </p:cNvSpPr>
-          <p:nvPr>
-            <p:ph idx="1"/>
-          </p:nvPr>
-        </p:nvSpPr>
-        <p:spPr/>
-        <p:txBody>
-          <a:bodyPr/>
-          <a:lstStyle/>
-          <a:p>
-            <a:pPr marL="0" indent="0">
-              <a:buNone/>
-            </a:pPr>
-            <a:r>
-              <a:rPr lang="en-US" dirty="0"/>
-              <a:t>User can change how granular nodes should be (e.g. 5 degrees)</a:t>
-            </a:r>
-          </a:p>
-          <a:p>
-            <a:pPr marL="0" indent="0">
-              <a:buNone/>
-            </a:pPr>
-            <a:endParaRPr lang="en-US" dirty="0"/>
-          </a:p>
-        </p:txBody>
-      </p:sp>
-      <p:pic>
-        <p:nvPicPr>
-          <p:cNvPr id="4" name="Picture 3">
-            <a:extLst>
-              <a:ext uri="{FF2B5EF4-FFF2-40B4-BE49-F238E27FC236}">
-                <a16:creationId xmlns:a16="http://schemas.microsoft.com/office/drawing/2014/main" id="{3E0919F1-D8EE-447B-BF85-AD928F97B140}"/>
-              </a:ext>
-            </a:extLst>
-          </p:cNvPr>
-          <p:cNvPicPr>
-            <a:picLocks noChangeAspect="1"/>
-          </p:cNvPicPr>
-          <p:nvPr/>
-        </p:nvPicPr>
-        <p:blipFill>
-          <a:blip r:embed="rId2"/>
-          <a:stretch>
-            <a:fillRect/>
-          </a:stretch>
-        </p:blipFill>
-        <p:spPr>
-          <a:xfrm>
-            <a:off x="838200" y="2270125"/>
-            <a:ext cx="8875047" cy="4587875"/>
-          </a:xfrm>
-          <a:prstGeom prst="rect">
-            <a:avLst/>
-          </a:prstGeom>
-        </p:spPr>
-      </p:pic>
-      <p:sp>
-        <p:nvSpPr>
-          <p:cNvPr id="5" name="TextBox 4">
-            <a:extLst>
-              <a:ext uri="{FF2B5EF4-FFF2-40B4-BE49-F238E27FC236}">
-                <a16:creationId xmlns:a16="http://schemas.microsoft.com/office/drawing/2014/main" id="{17BE68D2-75ED-4A0A-9694-69192378E0D6}"/>
-              </a:ext>
-            </a:extLst>
-          </p:cNvPr>
-          <p:cNvSpPr txBox="1"/>
-          <p:nvPr/>
-        </p:nvSpPr>
-        <p:spPr>
-          <a:xfrm>
-            <a:off x="9713247" y="5715298"/>
-            <a:ext cx="1696618" cy="923330"/>
-          </a:xfrm>
-          <a:prstGeom prst="rect">
-            <a:avLst/>
-          </a:prstGeom>
-          <a:noFill/>
-        </p:spPr>
-        <p:txBody>
-          <a:bodyPr wrap="none" rtlCol="0">
-            <a:spAutoFit/>
-          </a:bodyPr>
-          <a:lstStyle/>
-          <a:p>
-            <a:r>
-              <a:rPr lang="en-US" dirty="0">
-                <a:solidFill>
-                  <a:schemeClr val="accent6">
-                    <a:lumMod val="50000"/>
-                  </a:schemeClr>
-                </a:solidFill>
-              </a:rPr>
-              <a:t>Green</a:t>
-            </a:r>
-            <a:r>
-              <a:rPr lang="en-US" dirty="0"/>
-              <a:t> = inland</a:t>
-            </a:r>
-          </a:p>
-          <a:p>
-            <a:r>
-              <a:rPr lang="en-US" dirty="0">
-                <a:solidFill>
-                  <a:schemeClr val="accent5">
-                    <a:lumMod val="50000"/>
-                  </a:schemeClr>
-                </a:solidFill>
-              </a:rPr>
-              <a:t>Blue</a:t>
-            </a:r>
-            <a:r>
-              <a:rPr lang="en-US" dirty="0"/>
-              <a:t> = sea port</a:t>
-            </a:r>
-          </a:p>
-          <a:p>
-            <a:r>
-              <a:rPr lang="en-US" dirty="0"/>
-              <a:t>Grey = sea node</a:t>
-            </a:r>
-            <a:endParaRPr lang="en-AT" dirty="0"/>
-          </a:p>
-        </p:txBody>
-      </p:sp>
-    </p:spTree>
-    <p:extLst>
-      <p:ext uri="{BB962C8B-B14F-4D97-AF65-F5344CB8AC3E}">
-        <p14:creationId xmlns:p14="http://schemas.microsoft.com/office/powerpoint/2010/main" val="2542332510"/>
-      </p:ext>
-    </p:extLst>
-  </p:cSld>
-  <p:clrMapOvr>
-    <a:masterClrMapping/>
-  </p:clrMapOvr>
-</p:sld>
-</file>
-
-<file path=ppt/slides/slide11.xml><?xml version="1.0" encoding="utf-8"?>
-<p:sld xmlns:a="http://schemas.openxmlformats.org/drawingml/2006/main" xmlns:r="http://schemas.openxmlformats.org/officeDocument/2006/relationships" xmlns:p="http://schemas.openxmlformats.org/presentationml/2006/main">
-  <p:cSld>
-    <p:spTree>
-      <p:nvGrpSpPr>
-        <p:cNvPr id="1" name=""/>
-        <p:cNvGrpSpPr/>
-        <p:nvPr/>
-      </p:nvGrpSpPr>
-      <p:grpSpPr>
-        <a:xfrm>
-          <a:off x="0" y="0"/>
-          <a:ext cx="0" cy="0"/>
-          <a:chOff x="0" y="0"/>
-          <a:chExt cx="0" cy="0"/>
-        </a:xfrm>
-      </p:grpSpPr>
-      <p:sp>
-        <p:nvSpPr>
-          <p:cNvPr id="2" name="Title 1">
-            <a:extLst>
-              <a:ext uri="{FF2B5EF4-FFF2-40B4-BE49-F238E27FC236}">
-                <a16:creationId xmlns:a16="http://schemas.microsoft.com/office/drawing/2014/main" id="{E4B3FE24-EBF9-4E35-8F8A-299A89BD8301}"/>
-              </a:ext>
-            </a:extLst>
-          </p:cNvPr>
-          <p:cNvSpPr>
-            <a:spLocks noGrp="1"/>
-          </p:cNvSpPr>
-          <p:nvPr>
-            <p:ph type="title"/>
-          </p:nvPr>
-        </p:nvSpPr>
-        <p:spPr/>
-        <p:txBody>
-          <a:bodyPr/>
-          <a:lstStyle/>
-          <a:p>
-            <a:r>
-              <a:rPr lang="en-US" dirty="0"/>
-              <a:t>Double-constrained gravity model</a:t>
-            </a:r>
-            <a:endParaRPr lang="en-AT" dirty="0"/>
-          </a:p>
-        </p:txBody>
-      </p:sp>
-      <p:sp>
-        <p:nvSpPr>
-          <p:cNvPr id="3" name="Content Placeholder 2">
-            <a:extLst>
-              <a:ext uri="{FF2B5EF4-FFF2-40B4-BE49-F238E27FC236}">
-                <a16:creationId xmlns:a16="http://schemas.microsoft.com/office/drawing/2014/main" id="{5E2FFF4C-1657-48F9-BAA1-6F766DE29DB1}"/>
-              </a:ext>
-            </a:extLst>
-          </p:cNvPr>
-          <p:cNvSpPr>
-            <a:spLocks noGrp="1"/>
-          </p:cNvSpPr>
-          <p:nvPr>
-            <p:ph idx="1"/>
-          </p:nvPr>
-        </p:nvSpPr>
-        <p:spPr/>
-        <p:txBody>
-          <a:bodyPr/>
-          <a:lstStyle/>
-          <a:p>
-            <a:pPr marL="0" indent="0">
-              <a:buNone/>
-            </a:pPr>
-            <a:r>
-              <a:rPr lang="en-US" dirty="0"/>
-              <a:t>Solve trade flows based on:</a:t>
-            </a:r>
-          </a:p>
-          <a:p>
-            <a:pPr marL="0" indent="0">
-              <a:buNone/>
-            </a:pPr>
-            <a:r>
-              <a:rPr lang="en-US" dirty="0"/>
-              <a:t> </a:t>
-            </a:r>
-          </a:p>
-          <a:p>
-            <a:pPr marL="514350" indent="-514350">
-              <a:buAutoNum type="arabicParenR"/>
-            </a:pPr>
-            <a:r>
-              <a:rPr lang="en-US" dirty="0"/>
-              <a:t>Supply from region </a:t>
-            </a:r>
-            <a:r>
-              <a:rPr lang="en-US" b="1" dirty="0" err="1"/>
-              <a:t>i</a:t>
-            </a:r>
-            <a:endParaRPr lang="en-US" b="1" dirty="0"/>
-          </a:p>
-          <a:p>
-            <a:pPr marL="514350" indent="-514350">
-              <a:buAutoNum type="arabicParenR"/>
-            </a:pPr>
-            <a:r>
-              <a:rPr lang="en-US" dirty="0"/>
-              <a:t>Demand in region </a:t>
-            </a:r>
-            <a:r>
-              <a:rPr lang="en-US" b="1" dirty="0"/>
-              <a:t>j</a:t>
-            </a:r>
-          </a:p>
-          <a:p>
-            <a:pPr marL="514350" indent="-514350">
-              <a:buAutoNum type="arabicParenR"/>
-            </a:pPr>
-            <a:r>
-              <a:rPr lang="en-US" dirty="0"/>
-              <a:t>Distance between </a:t>
-            </a:r>
-            <a:r>
-              <a:rPr lang="en-US" b="1" dirty="0" err="1"/>
-              <a:t>i</a:t>
-            </a:r>
-            <a:r>
-              <a:rPr lang="en-US" dirty="0"/>
-              <a:t> and </a:t>
-            </a:r>
-            <a:r>
-              <a:rPr lang="en-US" b="1" dirty="0"/>
-              <a:t>j</a:t>
-            </a:r>
-            <a:endParaRPr lang="en-AT" dirty="0"/>
-          </a:p>
-        </p:txBody>
-      </p:sp>
-    </p:spTree>
-    <p:extLst>
-      <p:ext uri="{BB962C8B-B14F-4D97-AF65-F5344CB8AC3E}">
-        <p14:creationId xmlns:p14="http://schemas.microsoft.com/office/powerpoint/2010/main" val="2502605012"/>
-      </p:ext>
-    </p:extLst>
-  </p:cSld>
-  <p:clrMapOvr>
-    <a:masterClrMapping/>
-  </p:clrMapOvr>
-</p:sld>
-</file>
-
-<file path=ppt/slides/slide12.xml><?xml version="1.0" encoding="utf-8"?>
-<p:sld xmlns:a="http://schemas.openxmlformats.org/drawingml/2006/main" xmlns:r="http://schemas.openxmlformats.org/officeDocument/2006/relationships" xmlns:p="http://schemas.openxmlformats.org/presentationml/2006/main">
-  <p:cSld>
-    <p:spTree>
-      <p:nvGrpSpPr>
-        <p:cNvPr id="1" name=""/>
-        <p:cNvGrpSpPr/>
-        <p:nvPr/>
-      </p:nvGrpSpPr>
-      <p:grpSpPr>
-        <a:xfrm>
-          <a:off x="0" y="0"/>
-          <a:ext cx="0" cy="0"/>
-          <a:chOff x="0" y="0"/>
-          <a:chExt cx="0" cy="0"/>
-        </a:xfrm>
-      </p:grpSpPr>
-      <p:sp>
-        <p:nvSpPr>
-          <p:cNvPr id="2" name="Title 1">
-            <a:extLst>
-              <a:ext uri="{FF2B5EF4-FFF2-40B4-BE49-F238E27FC236}">
                 <a16:creationId xmlns:a16="http://schemas.microsoft.com/office/drawing/2014/main" id="{E4B3FE24-EBF9-4E35-8F8A-299A89BD8301}"/>
               </a:ext>
             </a:extLst>
@@ -3877,8 +3538,8 @@
           </a:p>
         </p:txBody>
       </p:sp>
-      <mc:AlternateContent xmlns:mc="http://schemas.openxmlformats.org/markup-compatibility/2006">
-        <mc:Choice xmlns:a14="http://schemas.microsoft.com/office/drawing/2010/main" Requires="a14">
+      <mc:AlternateContent xmlns:mc="http://schemas.openxmlformats.org/markup-compatibility/2006" xmlns:a14="http://schemas.microsoft.com/office/drawing/2010/main">
+        <mc:Choice Requires="a14">
           <p:sp>
             <p:nvSpPr>
               <p:cNvPr id="3" name="Content Placeholder 2">
@@ -4378,7 +4039,7 @@
             </p:txBody>
           </p:sp>
         </mc:Choice>
-        <mc:Fallback>
+        <mc:Fallback xmlns="">
           <p:sp>
             <p:nvSpPr>
               <p:cNvPr id="3" name="Content Placeholder 2">
@@ -4435,7 +4096,7 @@
 </p:sld>
 </file>
 
-<file path=ppt/slides/slide13.xml><?xml version="1.0" encoding="utf-8"?>
+<file path=ppt/slides/slide11.xml><?xml version="1.0" encoding="utf-8"?>
 <p:sld xmlns:a="http://schemas.openxmlformats.org/drawingml/2006/main" xmlns:r="http://schemas.openxmlformats.org/officeDocument/2006/relationships" xmlns:p="http://schemas.openxmlformats.org/presentationml/2006/main">
   <p:cSld>
     <p:spTree>
@@ -4496,8 +4157,8 @@
           </a:p>
         </p:txBody>
       </p:sp>
-      <mc:AlternateContent xmlns:mc="http://schemas.openxmlformats.org/markup-compatibility/2006">
-        <mc:Choice xmlns:a14="http://schemas.microsoft.com/office/drawing/2010/main" Requires="a14">
+      <mc:AlternateContent xmlns:mc="http://schemas.openxmlformats.org/markup-compatibility/2006" xmlns:a14="http://schemas.microsoft.com/office/drawing/2010/main">
+        <mc:Choice Requires="a14">
           <p:sp>
             <p:nvSpPr>
               <p:cNvPr id="3" name="Content Placeholder 2">
@@ -4722,7 +4383,7 @@
                       <m:sSup>
                         <m:sSupPr>
                           <m:ctrlPr>
-                            <a:rPr lang="en-US" b="0" i="0" smtClean="0">
+                            <a:rPr lang="en-US" b="0" i="1" smtClean="0">
                               <a:latin typeface="Cambria Math" panose="02040503050406030204" pitchFamily="18" charset="0"/>
                             </a:rPr>
                           </m:ctrlPr>
@@ -5154,7 +4815,7 @@
             </p:txBody>
           </p:sp>
         </mc:Choice>
-        <mc:Fallback>
+        <mc:Fallback xmlns="">
           <p:sp>
             <p:nvSpPr>
               <p:cNvPr id="3" name="Content Placeholder 2">
@@ -5211,7 +4872,7 @@
 </p:sld>
 </file>
 
-<file path=ppt/slides/slide14.xml><?xml version="1.0" encoding="utf-8"?>
+<file path=ppt/slides/slide12.xml><?xml version="1.0" encoding="utf-8"?>
 <p:sld xmlns:a="http://schemas.openxmlformats.org/drawingml/2006/main" xmlns:r="http://schemas.openxmlformats.org/officeDocument/2006/relationships" xmlns:p="http://schemas.openxmlformats.org/presentationml/2006/main">
   <p:cSld>
     <p:spTree>
@@ -5272,8 +4933,8 @@
           </a:p>
         </p:txBody>
       </p:sp>
-      <mc:AlternateContent xmlns:mc="http://schemas.openxmlformats.org/markup-compatibility/2006">
-        <mc:Choice xmlns:a14="http://schemas.microsoft.com/office/drawing/2010/main" Requires="a14">
+      <mc:AlternateContent xmlns:mc="http://schemas.openxmlformats.org/markup-compatibility/2006" xmlns:a14="http://schemas.microsoft.com/office/drawing/2010/main">
+        <mc:Choice Requires="a14">
           <p:sp>
             <p:nvSpPr>
               <p:cNvPr id="3" name="Content Placeholder 2">
@@ -6139,7 +5800,7 @@
             </p:txBody>
           </p:sp>
         </mc:Choice>
-        <mc:Fallback>
+        <mc:Fallback xmlns="">
           <p:sp>
             <p:nvSpPr>
               <p:cNvPr id="3" name="Content Placeholder 2">
@@ -6196,7 +5857,7 @@
 </p:sld>
 </file>
 
-<file path=ppt/slides/slide15.xml><?xml version="1.0" encoding="utf-8"?>
+<file path=ppt/slides/slide13.xml><?xml version="1.0" encoding="utf-8"?>
 <p:sld xmlns:a="http://schemas.openxmlformats.org/drawingml/2006/main" xmlns:r="http://schemas.openxmlformats.org/officeDocument/2006/relationships" xmlns:p="http://schemas.openxmlformats.org/presentationml/2006/main">
   <p:cSld>
     <p:spTree>
@@ -6257,8 +5918,8 @@
           </a:p>
         </p:txBody>
       </p:sp>
-      <mc:AlternateContent xmlns:mc="http://schemas.openxmlformats.org/markup-compatibility/2006">
-        <mc:Choice xmlns:a14="http://schemas.microsoft.com/office/drawing/2010/main" Requires="a14">
+      <mc:AlternateContent xmlns:mc="http://schemas.openxmlformats.org/markup-compatibility/2006" xmlns:a14="http://schemas.microsoft.com/office/drawing/2010/main">
+        <mc:Choice Requires="a14">
           <p:sp>
             <p:nvSpPr>
               <p:cNvPr id="3" name="Content Placeholder 2">
@@ -6750,7 +6411,7 @@
             </p:txBody>
           </p:sp>
         </mc:Choice>
-        <mc:Fallback>
+        <mc:Fallback xmlns="">
           <p:sp>
             <p:nvSpPr>
               <p:cNvPr id="3" name="Content Placeholder 2">
@@ -6807,7 +6468,7 @@
 </p:sld>
 </file>
 
-<file path=ppt/slides/slide16.xml><?xml version="1.0" encoding="utf-8"?>
+<file path=ppt/slides/slide14.xml><?xml version="1.0" encoding="utf-8"?>
 <p:sld xmlns:a="http://schemas.openxmlformats.org/drawingml/2006/main" xmlns:r="http://schemas.openxmlformats.org/officeDocument/2006/relationships" xmlns:p="http://schemas.openxmlformats.org/presentationml/2006/main">
   <p:cSld>
     <p:spTree>
@@ -6973,7 +6634,7 @@
 </p:sld>
 </file>
 
-<file path=ppt/slides/slide17.xml><?xml version="1.0" encoding="utf-8"?>
+<file path=ppt/slides/slide15.xml><?xml version="1.0" encoding="utf-8"?>
 <p:sld xmlns:a="http://schemas.openxmlformats.org/drawingml/2006/main" xmlns:r="http://schemas.openxmlformats.org/officeDocument/2006/relationships" xmlns:p="http://schemas.openxmlformats.org/presentationml/2006/main">
   <p:cSld>
     <p:spTree>
@@ -7597,33 +7258,40 @@
           <a:p>
             <a:r>
               <a:rPr lang="en-US" dirty="0"/>
-              <a:t>Region-specific energy values for </a:t>
-            </a:r>
-            <a:r>
-              <a:rPr lang="en-US" b="1" dirty="0"/>
-              <a:t>coal </a:t>
-            </a:r>
+              <a:t>Use country-specific NCV from IEA where available</a:t>
+            </a:r>
+          </a:p>
+          <a:p>
+            <a:pPr lvl="1"/>
             <a:r>
               <a:rPr lang="en-US" dirty="0"/>
-              <a:t>(COAL) and </a:t>
-            </a:r>
-            <a:r>
-              <a:rPr lang="en-US" b="1" dirty="0"/>
-              <a:t>crude </a:t>
+              <a:t>Uniquely </a:t>
+            </a:r>
+            <a:r>
+              <a:rPr lang="en-US" dirty="0" err="1"/>
+              <a:t>ID’d</a:t>
             </a:r>
             <a:r>
               <a:rPr lang="en-US" dirty="0"/>
-              <a:t>(CRU)</a:t>
-            </a:r>
-          </a:p>
-          <a:p>
+              <a:t> at the country-energy resource level</a:t>
+            </a:r>
+          </a:p>
+          <a:p>
+            <a:pPr lvl="1"/>
+            <a:r>
+              <a:rPr lang="en-US" dirty="0"/>
+              <a:t>Hold it constant over time</a:t>
+            </a:r>
+          </a:p>
+          <a:p>
+            <a:r>
+              <a:rPr lang="en-US" dirty="0"/>
+              <a:t>Where country-level data are not available, average NCV by resource</a:t>
+            </a:r>
+          </a:p>
+          <a:p>
+            <a:pPr lvl="1"/>
             <a:endParaRPr lang="en-US" dirty="0"/>
-          </a:p>
-          <a:p>
-            <a:r>
-              <a:rPr lang="en-US" dirty="0"/>
-              <a:t>Overall specific energy for petroleum (PET), uranium (NUC), and bioenergy (BIO)….for now</a:t>
-            </a:r>
           </a:p>
           <a:p>
             <a:pPr marL="0" indent="0">
@@ -7653,334 +7321,6 @@
 </file>
 
 <file path=ppt/slides/slide6.xml><?xml version="1.0" encoding="utf-8"?>
-<p:sld xmlns:a="http://schemas.openxmlformats.org/drawingml/2006/main" xmlns:r="http://schemas.openxmlformats.org/officeDocument/2006/relationships" xmlns:p="http://schemas.openxmlformats.org/presentationml/2006/main">
-  <p:cSld>
-    <p:spTree>
-      <p:nvGrpSpPr>
-        <p:cNvPr id="1" name=""/>
-        <p:cNvGrpSpPr/>
-        <p:nvPr/>
-      </p:nvGrpSpPr>
-      <p:grpSpPr>
-        <a:xfrm>
-          <a:off x="0" y="0"/>
-          <a:ext cx="0" cy="0"/>
-          <a:chOff x="0" y="0"/>
-          <a:chExt cx="0" cy="0"/>
-        </a:xfrm>
-      </p:grpSpPr>
-      <p:sp>
-        <p:nvSpPr>
-          <p:cNvPr id="2" name="Title 1">
-            <a:extLst>
-              <a:ext uri="{FF2B5EF4-FFF2-40B4-BE49-F238E27FC236}">
-                <a16:creationId xmlns:a16="http://schemas.microsoft.com/office/drawing/2014/main" id="{88E1C1A6-FE28-4763-B395-F7A572D92662}"/>
-              </a:ext>
-            </a:extLst>
-          </p:cNvPr>
-          <p:cNvSpPr>
-            <a:spLocks noGrp="1"/>
-          </p:cNvSpPr>
-          <p:nvPr>
-            <p:ph type="title"/>
-          </p:nvPr>
-        </p:nvSpPr>
-        <p:spPr/>
-        <p:txBody>
-          <a:bodyPr/>
-          <a:lstStyle/>
-          <a:p>
-            <a:r>
-              <a:rPr lang="en-US" dirty="0"/>
-              <a:t>Converting trade to physical energy</a:t>
-            </a:r>
-            <a:endParaRPr lang="en-AT" dirty="0"/>
-          </a:p>
-        </p:txBody>
-      </p:sp>
-      <p:sp>
-        <p:nvSpPr>
-          <p:cNvPr id="3" name="Content Placeholder 2">
-            <a:extLst>
-              <a:ext uri="{FF2B5EF4-FFF2-40B4-BE49-F238E27FC236}">
-                <a16:creationId xmlns:a16="http://schemas.microsoft.com/office/drawing/2014/main" id="{DA5AD138-66C6-4FD8-9960-25CFA8A26CFC}"/>
-              </a:ext>
-            </a:extLst>
-          </p:cNvPr>
-          <p:cNvSpPr>
-            <a:spLocks noGrp="1"/>
-          </p:cNvSpPr>
-          <p:nvPr>
-            <p:ph idx="1"/>
-          </p:nvPr>
-        </p:nvSpPr>
-        <p:spPr/>
-        <p:txBody>
-          <a:bodyPr/>
-          <a:lstStyle/>
-          <a:p>
-            <a:pPr marL="0" indent="0">
-              <a:buNone/>
-            </a:pPr>
-            <a:r>
-              <a:rPr lang="en-US" u="sng" dirty="0"/>
-              <a:t>Coal</a:t>
-            </a:r>
-          </a:p>
-          <a:p>
-            <a:pPr lvl="1"/>
-            <a:r>
-              <a:rPr lang="en-US" dirty="0"/>
-              <a:t>Share of (lignite + sub-bituminous) and (anthracite + bituminous) in reserves (BP Statistical Workbook, 2007)</a:t>
-            </a:r>
-          </a:p>
-          <a:p>
-            <a:pPr lvl="1"/>
-            <a:r>
-              <a:rPr lang="en-US" dirty="0"/>
-              <a:t>Calculate mean specific energy, weighted by reserve share for each country/region </a:t>
-            </a:r>
-          </a:p>
-          <a:p>
-            <a:pPr marL="0" indent="0">
-              <a:buNone/>
-            </a:pPr>
-            <a:endParaRPr lang="en-US" dirty="0"/>
-          </a:p>
-          <a:p>
-            <a:pPr marL="0" indent="0">
-              <a:buNone/>
-            </a:pPr>
-            <a:endParaRPr lang="en-US" dirty="0"/>
-          </a:p>
-        </p:txBody>
-      </p:sp>
-      <p:pic>
-        <p:nvPicPr>
-          <p:cNvPr id="5" name="Picture 4">
-            <a:extLst>
-              <a:ext uri="{FF2B5EF4-FFF2-40B4-BE49-F238E27FC236}">
-                <a16:creationId xmlns:a16="http://schemas.microsoft.com/office/drawing/2014/main" id="{4041C8A3-386F-4BD3-AA96-E1BD4ED1D610}"/>
-              </a:ext>
-            </a:extLst>
-          </p:cNvPr>
-          <p:cNvPicPr>
-            <a:picLocks noChangeAspect="1"/>
-          </p:cNvPicPr>
-          <p:nvPr/>
-        </p:nvPicPr>
-        <p:blipFill>
-          <a:blip r:embed="rId2"/>
-          <a:stretch>
-            <a:fillRect/>
-          </a:stretch>
-        </p:blipFill>
-        <p:spPr>
-          <a:xfrm>
-            <a:off x="1724025" y="4001294"/>
-            <a:ext cx="8743950" cy="1990725"/>
-          </a:xfrm>
-          <a:prstGeom prst="rect">
-            <a:avLst/>
-          </a:prstGeom>
-        </p:spPr>
-      </p:pic>
-    </p:spTree>
-    <p:extLst>
-      <p:ext uri="{BB962C8B-B14F-4D97-AF65-F5344CB8AC3E}">
-        <p14:creationId xmlns:p14="http://schemas.microsoft.com/office/powerpoint/2010/main" val="289118574"/>
-      </p:ext>
-    </p:extLst>
-  </p:cSld>
-  <p:clrMapOvr>
-    <a:masterClrMapping/>
-  </p:clrMapOvr>
-</p:sld>
-</file>
-
-<file path=ppt/slides/slide7.xml><?xml version="1.0" encoding="utf-8"?>
-<p:sld xmlns:a="http://schemas.openxmlformats.org/drawingml/2006/main" xmlns:r="http://schemas.openxmlformats.org/officeDocument/2006/relationships" xmlns:p="http://schemas.openxmlformats.org/presentationml/2006/main">
-  <p:cSld>
-    <p:spTree>
-      <p:nvGrpSpPr>
-        <p:cNvPr id="1" name=""/>
-        <p:cNvGrpSpPr/>
-        <p:nvPr/>
-      </p:nvGrpSpPr>
-      <p:grpSpPr>
-        <a:xfrm>
-          <a:off x="0" y="0"/>
-          <a:ext cx="0" cy="0"/>
-          <a:chOff x="0" y="0"/>
-          <a:chExt cx="0" cy="0"/>
-        </a:xfrm>
-      </p:grpSpPr>
-      <p:sp>
-        <p:nvSpPr>
-          <p:cNvPr id="2" name="Title 1">
-            <a:extLst>
-              <a:ext uri="{FF2B5EF4-FFF2-40B4-BE49-F238E27FC236}">
-                <a16:creationId xmlns:a16="http://schemas.microsoft.com/office/drawing/2014/main" id="{88E1C1A6-FE28-4763-B395-F7A572D92662}"/>
-              </a:ext>
-            </a:extLst>
-          </p:cNvPr>
-          <p:cNvSpPr>
-            <a:spLocks noGrp="1"/>
-          </p:cNvSpPr>
-          <p:nvPr>
-            <p:ph type="title"/>
-          </p:nvPr>
-        </p:nvSpPr>
-        <p:spPr/>
-        <p:txBody>
-          <a:bodyPr/>
-          <a:lstStyle/>
-          <a:p>
-            <a:r>
-              <a:rPr lang="en-US" dirty="0"/>
-              <a:t>Converting trade to physical energy</a:t>
-            </a:r>
-            <a:endParaRPr lang="en-AT" dirty="0"/>
-          </a:p>
-        </p:txBody>
-      </p:sp>
-      <p:sp>
-        <p:nvSpPr>
-          <p:cNvPr id="3" name="Content Placeholder 2">
-            <a:extLst>
-              <a:ext uri="{FF2B5EF4-FFF2-40B4-BE49-F238E27FC236}">
-                <a16:creationId xmlns:a16="http://schemas.microsoft.com/office/drawing/2014/main" id="{DA5AD138-66C6-4FD8-9960-25CFA8A26CFC}"/>
-              </a:ext>
-            </a:extLst>
-          </p:cNvPr>
-          <p:cNvSpPr>
-            <a:spLocks noGrp="1"/>
-          </p:cNvSpPr>
-          <p:nvPr>
-            <p:ph idx="1"/>
-          </p:nvPr>
-        </p:nvSpPr>
-        <p:spPr/>
-        <p:txBody>
-          <a:bodyPr/>
-          <a:lstStyle/>
-          <a:p>
-            <a:pPr marL="0" indent="0">
-              <a:buNone/>
-            </a:pPr>
-            <a:r>
-              <a:rPr lang="en-US" u="sng" dirty="0"/>
-              <a:t>Crude</a:t>
-            </a:r>
-          </a:p>
-          <a:p>
-            <a:pPr lvl="1"/>
-            <a:r>
-              <a:rPr lang="en-US" dirty="0"/>
-              <a:t>Use representative API gravity for each benchmark and assign to region</a:t>
-            </a:r>
-          </a:p>
-          <a:p>
-            <a:pPr lvl="1"/>
-            <a:r>
-              <a:rPr lang="en-US" dirty="0"/>
-              <a:t>Calculate specific energy based on: </a:t>
-            </a:r>
-          </a:p>
-          <a:p>
-            <a:pPr marL="0" indent="0">
-              <a:buNone/>
-            </a:pPr>
-            <a:endParaRPr lang="en-US" dirty="0"/>
-          </a:p>
-          <a:p>
-            <a:pPr marL="0" indent="0">
-              <a:buNone/>
-            </a:pPr>
-            <a:endParaRPr lang="en-US" dirty="0"/>
-          </a:p>
-          <a:p>
-            <a:pPr marL="0" indent="0">
-              <a:buNone/>
-            </a:pPr>
-            <a:endParaRPr lang="en-US" dirty="0"/>
-          </a:p>
-        </p:txBody>
-      </p:sp>
-      <p:pic>
-        <p:nvPicPr>
-          <p:cNvPr id="4" name="Picture 3">
-            <a:extLst>
-              <a:ext uri="{FF2B5EF4-FFF2-40B4-BE49-F238E27FC236}">
-                <a16:creationId xmlns:a16="http://schemas.microsoft.com/office/drawing/2014/main" id="{27712752-82C4-43D9-A7B5-7AC7C22276AA}"/>
-              </a:ext>
-            </a:extLst>
-          </p:cNvPr>
-          <p:cNvPicPr>
-            <a:picLocks noChangeAspect="1"/>
-          </p:cNvPicPr>
-          <p:nvPr/>
-        </p:nvPicPr>
-        <p:blipFill>
-          <a:blip r:embed="rId2"/>
-          <a:stretch>
-            <a:fillRect/>
-          </a:stretch>
-        </p:blipFill>
-        <p:spPr>
-          <a:xfrm>
-            <a:off x="6311900" y="2626519"/>
-            <a:ext cx="3200400" cy="666750"/>
-          </a:xfrm>
-          <a:prstGeom prst="rect">
-            <a:avLst/>
-          </a:prstGeom>
-        </p:spPr>
-      </p:pic>
-      <p:pic>
-        <p:nvPicPr>
-          <p:cNvPr id="6" name="Picture 5">
-            <a:extLst>
-              <a:ext uri="{FF2B5EF4-FFF2-40B4-BE49-F238E27FC236}">
-                <a16:creationId xmlns:a16="http://schemas.microsoft.com/office/drawing/2014/main" id="{9094A1F2-B4AB-4A01-A094-DFC486A04628}"/>
-              </a:ext>
-            </a:extLst>
-          </p:cNvPr>
-          <p:cNvPicPr>
-            <a:picLocks noChangeAspect="1"/>
-          </p:cNvPicPr>
-          <p:nvPr/>
-        </p:nvPicPr>
-        <p:blipFill>
-          <a:blip r:embed="rId3"/>
-          <a:stretch>
-            <a:fillRect/>
-          </a:stretch>
-        </p:blipFill>
-        <p:spPr>
-          <a:xfrm>
-            <a:off x="1743075" y="3846910"/>
-            <a:ext cx="8705850" cy="2514600"/>
-          </a:xfrm>
-          <a:prstGeom prst="rect">
-            <a:avLst/>
-          </a:prstGeom>
-        </p:spPr>
-      </p:pic>
-    </p:spTree>
-    <p:extLst>
-      <p:ext uri="{BB962C8B-B14F-4D97-AF65-F5344CB8AC3E}">
-        <p14:creationId xmlns:p14="http://schemas.microsoft.com/office/powerpoint/2010/main" val="2776705711"/>
-      </p:ext>
-    </p:extLst>
-  </p:cSld>
-  <p:clrMapOvr>
-    <a:masterClrMapping/>
-  </p:clrMapOvr>
-</p:sld>
-</file>
-
-<file path=ppt/slides/slide8.xml><?xml version="1.0" encoding="utf-8"?>
 <p:sld xmlns:a="http://schemas.openxmlformats.org/drawingml/2006/main" xmlns:r="http://schemas.openxmlformats.org/officeDocument/2006/relationships" xmlns:p="http://schemas.openxmlformats.org/presentationml/2006/main">
   <p:cSld>
     <p:spTree>
@@ -8070,7 +7410,7 @@
 </p:sld>
 </file>
 
-<file path=ppt/slides/slide9.xml><?xml version="1.0" encoding="utf-8"?>
+<file path=ppt/slides/slide7.xml><?xml version="1.0" encoding="utf-8"?>
 <p:sld xmlns:a="http://schemas.openxmlformats.org/drawingml/2006/main" xmlns:r="http://schemas.openxmlformats.org/officeDocument/2006/relationships" xmlns:p="http://schemas.openxmlformats.org/presentationml/2006/main">
   <p:cSld>
     <p:spTree>
@@ -8255,6 +7595,348 @@
     <p:extLst>
       <p:ext uri="{BB962C8B-B14F-4D97-AF65-F5344CB8AC3E}">
         <p14:creationId xmlns:p14="http://schemas.microsoft.com/office/powerpoint/2010/main" val="426203672"/>
+      </p:ext>
+    </p:extLst>
+  </p:cSld>
+  <p:clrMapOvr>
+    <a:masterClrMapping/>
+  </p:clrMapOvr>
+</p:sld>
+</file>
+
+<file path=ppt/slides/slide8.xml><?xml version="1.0" encoding="utf-8"?>
+<p:sld xmlns:a="http://schemas.openxmlformats.org/drawingml/2006/main" xmlns:r="http://schemas.openxmlformats.org/officeDocument/2006/relationships" xmlns:p="http://schemas.openxmlformats.org/presentationml/2006/main">
+  <p:cSld>
+    <p:spTree>
+      <p:nvGrpSpPr>
+        <p:cNvPr id="1" name=""/>
+        <p:cNvGrpSpPr/>
+        <p:nvPr/>
+      </p:nvGrpSpPr>
+      <p:grpSpPr>
+        <a:xfrm>
+          <a:off x="0" y="0"/>
+          <a:ext cx="0" cy="0"/>
+          <a:chOff x="0" y="0"/>
+          <a:chExt cx="0" cy="0"/>
+        </a:xfrm>
+      </p:grpSpPr>
+      <p:sp>
+        <p:nvSpPr>
+          <p:cNvPr id="2" name="Title 1">
+            <a:extLst>
+              <a:ext uri="{FF2B5EF4-FFF2-40B4-BE49-F238E27FC236}">
+                <a16:creationId xmlns:a16="http://schemas.microsoft.com/office/drawing/2014/main" id="{88E1C1A6-FE28-4763-B395-F7A572D92662}"/>
+              </a:ext>
+            </a:extLst>
+          </p:cNvPr>
+          <p:cNvSpPr>
+            <a:spLocks noGrp="1"/>
+          </p:cNvSpPr>
+          <p:nvPr>
+            <p:ph type="title"/>
+          </p:nvPr>
+        </p:nvSpPr>
+        <p:spPr/>
+        <p:txBody>
+          <a:bodyPr/>
+          <a:lstStyle/>
+          <a:p>
+            <a:r>
+              <a:rPr lang="en-US" dirty="0"/>
+              <a:t>Mapping shortest paths</a:t>
+            </a:r>
+            <a:endParaRPr lang="en-AT" dirty="0"/>
+          </a:p>
+        </p:txBody>
+      </p:sp>
+      <p:sp>
+        <p:nvSpPr>
+          <p:cNvPr id="3" name="Content Placeholder 2">
+            <a:extLst>
+              <a:ext uri="{FF2B5EF4-FFF2-40B4-BE49-F238E27FC236}">
+                <a16:creationId xmlns:a16="http://schemas.microsoft.com/office/drawing/2014/main" id="{DA5AD138-66C6-4FD8-9960-25CFA8A26CFC}"/>
+              </a:ext>
+            </a:extLst>
+          </p:cNvPr>
+          <p:cNvSpPr>
+            <a:spLocks noGrp="1"/>
+          </p:cNvSpPr>
+          <p:nvPr>
+            <p:ph idx="1"/>
+          </p:nvPr>
+        </p:nvSpPr>
+        <p:spPr/>
+        <p:txBody>
+          <a:bodyPr/>
+          <a:lstStyle/>
+          <a:p>
+            <a:pPr marL="0" indent="0">
+              <a:buNone/>
+            </a:pPr>
+            <a:r>
+              <a:rPr lang="en-US" dirty="0"/>
+              <a:t>User can change how granular nodes should be (e.g. 5 degrees)</a:t>
+            </a:r>
+          </a:p>
+          <a:p>
+            <a:pPr marL="0" indent="0">
+              <a:buNone/>
+            </a:pPr>
+            <a:endParaRPr lang="en-US" dirty="0"/>
+          </a:p>
+        </p:txBody>
+      </p:sp>
+      <p:pic>
+        <p:nvPicPr>
+          <p:cNvPr id="4" name="Picture 3">
+            <a:extLst>
+              <a:ext uri="{FF2B5EF4-FFF2-40B4-BE49-F238E27FC236}">
+                <a16:creationId xmlns:a16="http://schemas.microsoft.com/office/drawing/2014/main" id="{3E0919F1-D8EE-447B-BF85-AD928F97B140}"/>
+              </a:ext>
+            </a:extLst>
+          </p:cNvPr>
+          <p:cNvPicPr>
+            <a:picLocks noChangeAspect="1"/>
+          </p:cNvPicPr>
+          <p:nvPr/>
+        </p:nvPicPr>
+        <p:blipFill>
+          <a:blip r:embed="rId2"/>
+          <a:stretch>
+            <a:fillRect/>
+          </a:stretch>
+        </p:blipFill>
+        <p:spPr>
+          <a:xfrm>
+            <a:off x="838200" y="2270125"/>
+            <a:ext cx="8875047" cy="4587875"/>
+          </a:xfrm>
+          <a:prstGeom prst="rect">
+            <a:avLst/>
+          </a:prstGeom>
+        </p:spPr>
+      </p:pic>
+      <p:sp>
+        <p:nvSpPr>
+          <p:cNvPr id="5" name="TextBox 4">
+            <a:extLst>
+              <a:ext uri="{FF2B5EF4-FFF2-40B4-BE49-F238E27FC236}">
+                <a16:creationId xmlns:a16="http://schemas.microsoft.com/office/drawing/2014/main" id="{17BE68D2-75ED-4A0A-9694-69192378E0D6}"/>
+              </a:ext>
+            </a:extLst>
+          </p:cNvPr>
+          <p:cNvSpPr txBox="1"/>
+          <p:nvPr/>
+        </p:nvSpPr>
+        <p:spPr>
+          <a:xfrm>
+            <a:off x="9713247" y="5715298"/>
+            <a:ext cx="1696618" cy="923330"/>
+          </a:xfrm>
+          <a:prstGeom prst="rect">
+            <a:avLst/>
+          </a:prstGeom>
+          <a:noFill/>
+        </p:spPr>
+        <p:txBody>
+          <a:bodyPr wrap="none" rtlCol="0">
+            <a:spAutoFit/>
+          </a:bodyPr>
+          <a:lstStyle/>
+          <a:p>
+            <a:r>
+              <a:rPr lang="en-US" dirty="0">
+                <a:solidFill>
+                  <a:schemeClr val="accent6">
+                    <a:lumMod val="50000"/>
+                  </a:schemeClr>
+                </a:solidFill>
+              </a:rPr>
+              <a:t>Green</a:t>
+            </a:r>
+            <a:r>
+              <a:rPr lang="en-US" dirty="0"/>
+              <a:t> = inland</a:t>
+            </a:r>
+          </a:p>
+          <a:p>
+            <a:r>
+              <a:rPr lang="en-US" dirty="0">
+                <a:solidFill>
+                  <a:schemeClr val="accent5">
+                    <a:lumMod val="50000"/>
+                  </a:schemeClr>
+                </a:solidFill>
+              </a:rPr>
+              <a:t>Blue</a:t>
+            </a:r>
+            <a:r>
+              <a:rPr lang="en-US" dirty="0"/>
+              <a:t> = sea port</a:t>
+            </a:r>
+          </a:p>
+          <a:p>
+            <a:r>
+              <a:rPr lang="en-US" dirty="0"/>
+              <a:t>Grey = sea node</a:t>
+            </a:r>
+            <a:endParaRPr lang="en-AT" dirty="0"/>
+          </a:p>
+        </p:txBody>
+      </p:sp>
+    </p:spTree>
+    <p:extLst>
+      <p:ext uri="{BB962C8B-B14F-4D97-AF65-F5344CB8AC3E}">
+        <p14:creationId xmlns:p14="http://schemas.microsoft.com/office/powerpoint/2010/main" val="2542332510"/>
+      </p:ext>
+    </p:extLst>
+  </p:cSld>
+  <p:clrMapOvr>
+    <a:masterClrMapping/>
+  </p:clrMapOvr>
+</p:sld>
+</file>
+
+<file path=ppt/slides/slide9.xml><?xml version="1.0" encoding="utf-8"?>
+<p:sld xmlns:a="http://schemas.openxmlformats.org/drawingml/2006/main" xmlns:r="http://schemas.openxmlformats.org/officeDocument/2006/relationships" xmlns:p="http://schemas.openxmlformats.org/presentationml/2006/main">
+  <p:cSld>
+    <p:spTree>
+      <p:nvGrpSpPr>
+        <p:cNvPr id="1" name=""/>
+        <p:cNvGrpSpPr/>
+        <p:nvPr/>
+      </p:nvGrpSpPr>
+      <p:grpSpPr>
+        <a:xfrm>
+          <a:off x="0" y="0"/>
+          <a:ext cx="0" cy="0"/>
+          <a:chOff x="0" y="0"/>
+          <a:chExt cx="0" cy="0"/>
+        </a:xfrm>
+      </p:grpSpPr>
+      <p:sp>
+        <p:nvSpPr>
+          <p:cNvPr id="2" name="Title 1">
+            <a:extLst>
+              <a:ext uri="{FF2B5EF4-FFF2-40B4-BE49-F238E27FC236}">
+                <a16:creationId xmlns:a16="http://schemas.microsoft.com/office/drawing/2014/main" id="{E4B3FE24-EBF9-4E35-8F8A-299A89BD8301}"/>
+              </a:ext>
+            </a:extLst>
+          </p:cNvPr>
+          <p:cNvSpPr>
+            <a:spLocks noGrp="1"/>
+          </p:cNvSpPr>
+          <p:nvPr>
+            <p:ph type="title"/>
+          </p:nvPr>
+        </p:nvSpPr>
+        <p:spPr/>
+        <p:txBody>
+          <a:bodyPr/>
+          <a:lstStyle/>
+          <a:p>
+            <a:r>
+              <a:rPr lang="en-US" dirty="0"/>
+              <a:t>Double-constrained gravity model</a:t>
+            </a:r>
+            <a:endParaRPr lang="en-AT" dirty="0"/>
+          </a:p>
+        </p:txBody>
+      </p:sp>
+      <p:sp>
+        <p:nvSpPr>
+          <p:cNvPr id="3" name="Content Placeholder 2">
+            <a:extLst>
+              <a:ext uri="{FF2B5EF4-FFF2-40B4-BE49-F238E27FC236}">
+                <a16:creationId xmlns:a16="http://schemas.microsoft.com/office/drawing/2014/main" id="{5E2FFF4C-1657-48F9-BAA1-6F766DE29DB1}"/>
+              </a:ext>
+            </a:extLst>
+          </p:cNvPr>
+          <p:cNvSpPr>
+            <a:spLocks noGrp="1"/>
+          </p:cNvSpPr>
+          <p:nvPr>
+            <p:ph idx="1"/>
+          </p:nvPr>
+        </p:nvSpPr>
+        <p:spPr/>
+        <p:txBody>
+          <a:bodyPr/>
+          <a:lstStyle/>
+          <a:p>
+            <a:pPr marL="0" indent="0">
+              <a:buNone/>
+            </a:pPr>
+            <a:r>
+              <a:rPr lang="en-US" dirty="0"/>
+              <a:t>Solve trade flows based on:</a:t>
+            </a:r>
+          </a:p>
+          <a:p>
+            <a:pPr marL="0" indent="0">
+              <a:buNone/>
+            </a:pPr>
+            <a:r>
+              <a:rPr lang="en-US" dirty="0"/>
+              <a:t> </a:t>
+            </a:r>
+          </a:p>
+          <a:p>
+            <a:pPr marL="514350" indent="-514350">
+              <a:buAutoNum type="arabicParenR"/>
+            </a:pPr>
+            <a:r>
+              <a:rPr lang="en-US" dirty="0"/>
+              <a:t>Supply from region </a:t>
+            </a:r>
+            <a:r>
+              <a:rPr lang="en-US" b="1" dirty="0" err="1"/>
+              <a:t>i</a:t>
+            </a:r>
+            <a:endParaRPr lang="en-US" b="1" dirty="0"/>
+          </a:p>
+          <a:p>
+            <a:pPr marL="514350" indent="-514350">
+              <a:buAutoNum type="arabicParenR"/>
+            </a:pPr>
+            <a:r>
+              <a:rPr lang="en-US" dirty="0"/>
+              <a:t>Demand in region </a:t>
+            </a:r>
+            <a:r>
+              <a:rPr lang="en-US" b="1" dirty="0"/>
+              <a:t>j</a:t>
+            </a:r>
+          </a:p>
+          <a:p>
+            <a:pPr marL="514350" indent="-514350">
+              <a:buAutoNum type="arabicParenR"/>
+            </a:pPr>
+            <a:r>
+              <a:rPr lang="en-US" dirty="0"/>
+              <a:t>Distance between </a:t>
+            </a:r>
+            <a:r>
+              <a:rPr lang="en-US" b="1" dirty="0" err="1"/>
+              <a:t>i</a:t>
+            </a:r>
+            <a:r>
+              <a:rPr lang="en-US" dirty="0"/>
+              <a:t> and </a:t>
+            </a:r>
+            <a:r>
+              <a:rPr lang="en-US" b="1" dirty="0"/>
+              <a:t>j</a:t>
+            </a:r>
+            <a:endParaRPr lang="en-AT" dirty="0"/>
+          </a:p>
+        </p:txBody>
+      </p:sp>
+    </p:spTree>
+    <p:extLst>
+      <p:ext uri="{BB962C8B-B14F-4D97-AF65-F5344CB8AC3E}">
+        <p14:creationId xmlns:p14="http://schemas.microsoft.com/office/powerpoint/2010/main" val="2502605012"/>
       </p:ext>
     </p:extLst>
   </p:cSld>

</xml_diff>

<commit_message>
Make list of non-IEA countries
</commit_message>
<xml_diff>
--- a/presentations/Update_2019-06-12.pptx
+++ b/presentations/Update_2019-06-12.pptx
@@ -10,16 +10,17 @@
     <p:sldId id="260" r:id="rId4"/>
     <p:sldId id="261" r:id="rId5"/>
     <p:sldId id="262" r:id="rId6"/>
-    <p:sldId id="265" r:id="rId7"/>
-    <p:sldId id="266" r:id="rId8"/>
-    <p:sldId id="267" r:id="rId9"/>
-    <p:sldId id="268" r:id="rId10"/>
-    <p:sldId id="269" r:id="rId11"/>
-    <p:sldId id="270" r:id="rId12"/>
-    <p:sldId id="271" r:id="rId13"/>
-    <p:sldId id="272" r:id="rId14"/>
-    <p:sldId id="258" r:id="rId15"/>
-    <p:sldId id="259" r:id="rId16"/>
+    <p:sldId id="273" r:id="rId7"/>
+    <p:sldId id="265" r:id="rId8"/>
+    <p:sldId id="266" r:id="rId9"/>
+    <p:sldId id="267" r:id="rId10"/>
+    <p:sldId id="268" r:id="rId11"/>
+    <p:sldId id="269" r:id="rId12"/>
+    <p:sldId id="270" r:id="rId13"/>
+    <p:sldId id="271" r:id="rId14"/>
+    <p:sldId id="272" r:id="rId15"/>
+    <p:sldId id="258" r:id="rId16"/>
+    <p:sldId id="259" r:id="rId17"/>
   </p:sldIdLst>
   <p:sldSz cx="12192000" cy="6858000"/>
   <p:notesSz cx="6858000" cy="9144000"/>
@@ -3478,6 +3479,154 @@
 </file>
 
 <file path=ppt/slides/slide10.xml><?xml version="1.0" encoding="utf-8"?>
+<p:sld xmlns:a="http://schemas.openxmlformats.org/drawingml/2006/main" xmlns:r="http://schemas.openxmlformats.org/officeDocument/2006/relationships" xmlns:p="http://schemas.openxmlformats.org/presentationml/2006/main">
+  <p:cSld>
+    <p:spTree>
+      <p:nvGrpSpPr>
+        <p:cNvPr id="1" name=""/>
+        <p:cNvGrpSpPr/>
+        <p:nvPr/>
+      </p:nvGrpSpPr>
+      <p:grpSpPr>
+        <a:xfrm>
+          <a:off x="0" y="0"/>
+          <a:ext cx="0" cy="0"/>
+          <a:chOff x="0" y="0"/>
+          <a:chExt cx="0" cy="0"/>
+        </a:xfrm>
+      </p:grpSpPr>
+      <p:sp>
+        <p:nvSpPr>
+          <p:cNvPr id="2" name="Title 1">
+            <a:extLst>
+              <a:ext uri="{FF2B5EF4-FFF2-40B4-BE49-F238E27FC236}">
+                <a16:creationId xmlns:a16="http://schemas.microsoft.com/office/drawing/2014/main" id="{E4B3FE24-EBF9-4E35-8F8A-299A89BD8301}"/>
+              </a:ext>
+            </a:extLst>
+          </p:cNvPr>
+          <p:cNvSpPr>
+            <a:spLocks noGrp="1"/>
+          </p:cNvSpPr>
+          <p:nvPr>
+            <p:ph type="title"/>
+          </p:nvPr>
+        </p:nvSpPr>
+        <p:spPr/>
+        <p:txBody>
+          <a:bodyPr/>
+          <a:lstStyle/>
+          <a:p>
+            <a:r>
+              <a:rPr lang="en-US" dirty="0"/>
+              <a:t>Double-constrained gravity model</a:t>
+            </a:r>
+            <a:endParaRPr lang="en-AT" dirty="0"/>
+          </a:p>
+        </p:txBody>
+      </p:sp>
+      <p:sp>
+        <p:nvSpPr>
+          <p:cNvPr id="3" name="Content Placeholder 2">
+            <a:extLst>
+              <a:ext uri="{FF2B5EF4-FFF2-40B4-BE49-F238E27FC236}">
+                <a16:creationId xmlns:a16="http://schemas.microsoft.com/office/drawing/2014/main" id="{5E2FFF4C-1657-48F9-BAA1-6F766DE29DB1}"/>
+              </a:ext>
+            </a:extLst>
+          </p:cNvPr>
+          <p:cNvSpPr>
+            <a:spLocks noGrp="1"/>
+          </p:cNvSpPr>
+          <p:nvPr>
+            <p:ph idx="1"/>
+          </p:nvPr>
+        </p:nvSpPr>
+        <p:spPr/>
+        <p:txBody>
+          <a:bodyPr/>
+          <a:lstStyle/>
+          <a:p>
+            <a:pPr marL="0" indent="0">
+              <a:buNone/>
+            </a:pPr>
+            <a:r>
+              <a:rPr lang="en-US" dirty="0"/>
+              <a:t>Solve trade flows based on:</a:t>
+            </a:r>
+          </a:p>
+          <a:p>
+            <a:pPr marL="0" indent="0">
+              <a:buNone/>
+            </a:pPr>
+            <a:r>
+              <a:rPr lang="en-US" dirty="0"/>
+              <a:t> </a:t>
+            </a:r>
+          </a:p>
+          <a:p>
+            <a:pPr marL="514350" indent="-514350">
+              <a:buAutoNum type="arabicParenR"/>
+            </a:pPr>
+            <a:r>
+              <a:rPr lang="en-US" dirty="0"/>
+              <a:t>Supply from region </a:t>
+            </a:r>
+            <a:r>
+              <a:rPr lang="en-US" b="1" dirty="0" err="1"/>
+              <a:t>i</a:t>
+            </a:r>
+            <a:endParaRPr lang="en-US" b="1" dirty="0"/>
+          </a:p>
+          <a:p>
+            <a:pPr marL="514350" indent="-514350">
+              <a:buAutoNum type="arabicParenR"/>
+            </a:pPr>
+            <a:r>
+              <a:rPr lang="en-US" dirty="0"/>
+              <a:t>Demand in region </a:t>
+            </a:r>
+            <a:r>
+              <a:rPr lang="en-US" b="1" dirty="0"/>
+              <a:t>j</a:t>
+            </a:r>
+          </a:p>
+          <a:p>
+            <a:pPr marL="514350" indent="-514350">
+              <a:buAutoNum type="arabicParenR"/>
+            </a:pPr>
+            <a:r>
+              <a:rPr lang="en-US" dirty="0"/>
+              <a:t>Distance between </a:t>
+            </a:r>
+            <a:r>
+              <a:rPr lang="en-US" b="1" dirty="0" err="1"/>
+              <a:t>i</a:t>
+            </a:r>
+            <a:r>
+              <a:rPr lang="en-US" dirty="0"/>
+              <a:t> and </a:t>
+            </a:r>
+            <a:r>
+              <a:rPr lang="en-US" b="1" dirty="0"/>
+              <a:t>j</a:t>
+            </a:r>
+            <a:endParaRPr lang="en-AT" dirty="0"/>
+          </a:p>
+        </p:txBody>
+      </p:sp>
+    </p:spTree>
+    <p:extLst>
+      <p:ext uri="{BB962C8B-B14F-4D97-AF65-F5344CB8AC3E}">
+        <p14:creationId xmlns:p14="http://schemas.microsoft.com/office/powerpoint/2010/main" val="2502605012"/>
+      </p:ext>
+    </p:extLst>
+  </p:cSld>
+  <p:clrMapOvr>
+    <a:masterClrMapping/>
+  </p:clrMapOvr>
+</p:sld>
+</file>
+
+<file path=ppt/slides/slide11.xml><?xml version="1.0" encoding="utf-8"?>
 <p:sld xmlns:a="http://schemas.openxmlformats.org/drawingml/2006/main" xmlns:r="http://schemas.openxmlformats.org/officeDocument/2006/relationships" xmlns:p="http://schemas.openxmlformats.org/presentationml/2006/main">
   <p:cSld>
     <p:spTree>
@@ -4096,7 +4245,7 @@
 </p:sld>
 </file>
 
-<file path=ppt/slides/slide11.xml><?xml version="1.0" encoding="utf-8"?>
+<file path=ppt/slides/slide12.xml><?xml version="1.0" encoding="utf-8"?>
 <p:sld xmlns:a="http://schemas.openxmlformats.org/drawingml/2006/main" xmlns:r="http://schemas.openxmlformats.org/officeDocument/2006/relationships" xmlns:p="http://schemas.openxmlformats.org/presentationml/2006/main">
   <p:cSld>
     <p:spTree>
@@ -4872,7 +5021,7 @@
 </p:sld>
 </file>
 
-<file path=ppt/slides/slide12.xml><?xml version="1.0" encoding="utf-8"?>
+<file path=ppt/slides/slide13.xml><?xml version="1.0" encoding="utf-8"?>
 <p:sld xmlns:a="http://schemas.openxmlformats.org/drawingml/2006/main" xmlns:r="http://schemas.openxmlformats.org/officeDocument/2006/relationships" xmlns:p="http://schemas.openxmlformats.org/presentationml/2006/main">
   <p:cSld>
     <p:spTree>
@@ -5857,7 +6006,7 @@
 </p:sld>
 </file>
 
-<file path=ppt/slides/slide13.xml><?xml version="1.0" encoding="utf-8"?>
+<file path=ppt/slides/slide14.xml><?xml version="1.0" encoding="utf-8"?>
 <p:sld xmlns:a="http://schemas.openxmlformats.org/drawingml/2006/main" xmlns:r="http://schemas.openxmlformats.org/officeDocument/2006/relationships" xmlns:p="http://schemas.openxmlformats.org/presentationml/2006/main">
   <p:cSld>
     <p:spTree>
@@ -6468,7 +6617,7 @@
 </p:sld>
 </file>
 
-<file path=ppt/slides/slide14.xml><?xml version="1.0" encoding="utf-8"?>
+<file path=ppt/slides/slide15.xml><?xml version="1.0" encoding="utf-8"?>
 <p:sld xmlns:a="http://schemas.openxmlformats.org/drawingml/2006/main" xmlns:r="http://schemas.openxmlformats.org/officeDocument/2006/relationships" xmlns:p="http://schemas.openxmlformats.org/presentationml/2006/main">
   <p:cSld>
     <p:spTree>
@@ -6634,7 +6783,7 @@
 </p:sld>
 </file>
 
-<file path=ppt/slides/slide15.xml><?xml version="1.0" encoding="utf-8"?>
+<file path=ppt/slides/slide16.xml><?xml version="1.0" encoding="utf-8"?>
 <p:sld xmlns:a="http://schemas.openxmlformats.org/drawingml/2006/main" xmlns:r="http://schemas.openxmlformats.org/officeDocument/2006/relationships" xmlns:p="http://schemas.openxmlformats.org/presentationml/2006/main">
   <p:cSld>
     <p:spTree>
@@ -7342,6 +7491,168 @@
           <p:cNvPr id="2" name="Title 1">
             <a:extLst>
               <a:ext uri="{FF2B5EF4-FFF2-40B4-BE49-F238E27FC236}">
+                <a16:creationId xmlns:a16="http://schemas.microsoft.com/office/drawing/2014/main" id="{6BDD51D3-E8E3-4577-A6F3-24E17AF11F61}"/>
+              </a:ext>
+            </a:extLst>
+          </p:cNvPr>
+          <p:cNvSpPr>
+            <a:spLocks noGrp="1"/>
+          </p:cNvSpPr>
+          <p:nvPr>
+            <p:ph type="title"/>
+          </p:nvPr>
+        </p:nvSpPr>
+        <p:spPr/>
+        <p:txBody>
+          <a:bodyPr/>
+          <a:lstStyle/>
+          <a:p>
+            <a:r>
+              <a:rPr lang="en-US" dirty="0"/>
+              <a:t>89 countries not represented in IEA-WEB</a:t>
+            </a:r>
+            <a:endParaRPr lang="en-AT" dirty="0"/>
+          </a:p>
+        </p:txBody>
+      </p:sp>
+      <p:sp>
+        <p:nvSpPr>
+          <p:cNvPr id="3" name="Content Placeholder 2">
+            <a:extLst>
+              <a:ext uri="{FF2B5EF4-FFF2-40B4-BE49-F238E27FC236}">
+                <a16:creationId xmlns:a16="http://schemas.microsoft.com/office/drawing/2014/main" id="{A01E74F3-0E1A-402F-B2E1-DCF580D6E93D}"/>
+              </a:ext>
+            </a:extLst>
+          </p:cNvPr>
+          <p:cNvSpPr>
+            <a:spLocks noGrp="1"/>
+          </p:cNvSpPr>
+          <p:nvPr>
+            <p:ph idx="1"/>
+          </p:nvPr>
+        </p:nvSpPr>
+        <p:spPr/>
+        <p:txBody>
+          <a:bodyPr>
+            <a:normAutofit lnSpcReduction="10000"/>
+          </a:bodyPr>
+          <a:lstStyle/>
+          <a:p>
+            <a:r>
+              <a:rPr lang="en-US" dirty="0"/>
+              <a:t>Mostly smaller islands</a:t>
+            </a:r>
+          </a:p>
+          <a:p>
+            <a:r>
+              <a:rPr lang="en-US" dirty="0"/>
+              <a:t>Larger nations include:</a:t>
+            </a:r>
+          </a:p>
+          <a:p>
+            <a:pPr lvl="1"/>
+            <a:r>
+              <a:rPr lang="en-US" dirty="0"/>
+              <a:t>Afghanistan</a:t>
+            </a:r>
+          </a:p>
+          <a:p>
+            <a:pPr lvl="1"/>
+            <a:r>
+              <a:rPr lang="en-US" dirty="0"/>
+              <a:t>Central African Republic</a:t>
+            </a:r>
+          </a:p>
+          <a:p>
+            <a:pPr lvl="1"/>
+            <a:r>
+              <a:rPr lang="en-US" dirty="0"/>
+              <a:t>Djibouti</a:t>
+            </a:r>
+          </a:p>
+          <a:p>
+            <a:pPr lvl="1"/>
+            <a:r>
+              <a:rPr lang="en-US" dirty="0"/>
+              <a:t>Gambia </a:t>
+            </a:r>
+          </a:p>
+          <a:p>
+            <a:pPr lvl="1"/>
+            <a:r>
+              <a:rPr lang="en-US" dirty="0"/>
+              <a:t>Greenland</a:t>
+            </a:r>
+          </a:p>
+          <a:p>
+            <a:pPr lvl="1"/>
+            <a:r>
+              <a:rPr lang="en-US" dirty="0"/>
+              <a:t>Madagascar</a:t>
+            </a:r>
+          </a:p>
+          <a:p>
+            <a:pPr lvl="1"/>
+            <a:r>
+              <a:rPr lang="en-US" dirty="0"/>
+              <a:t>Somalia</a:t>
+            </a:r>
+          </a:p>
+          <a:p>
+            <a:pPr lvl="1"/>
+            <a:r>
+              <a:rPr lang="en-US" dirty="0"/>
+              <a:t>Uganda</a:t>
+            </a:r>
+          </a:p>
+          <a:p>
+            <a:pPr lvl="1"/>
+            <a:r>
+              <a:rPr lang="en-US" dirty="0"/>
+              <a:t>Chad</a:t>
+            </a:r>
+          </a:p>
+          <a:p>
+            <a:pPr lvl="1"/>
+            <a:endParaRPr lang="en-AT" dirty="0"/>
+          </a:p>
+        </p:txBody>
+      </p:sp>
+    </p:spTree>
+    <p:extLst>
+      <p:ext uri="{BB962C8B-B14F-4D97-AF65-F5344CB8AC3E}">
+        <p14:creationId xmlns:p14="http://schemas.microsoft.com/office/powerpoint/2010/main" val="40004022"/>
+      </p:ext>
+    </p:extLst>
+  </p:cSld>
+  <p:clrMapOvr>
+    <a:masterClrMapping/>
+  </p:clrMapOvr>
+</p:sld>
+</file>
+
+<file path=ppt/slides/slide7.xml><?xml version="1.0" encoding="utf-8"?>
+<p:sld xmlns:a="http://schemas.openxmlformats.org/drawingml/2006/main" xmlns:r="http://schemas.openxmlformats.org/officeDocument/2006/relationships" xmlns:p="http://schemas.openxmlformats.org/presentationml/2006/main">
+  <p:cSld>
+    <p:spTree>
+      <p:nvGrpSpPr>
+        <p:cNvPr id="1" name=""/>
+        <p:cNvGrpSpPr/>
+        <p:nvPr/>
+      </p:nvGrpSpPr>
+      <p:grpSpPr>
+        <a:xfrm>
+          <a:off x="0" y="0"/>
+          <a:ext cx="0" cy="0"/>
+          <a:chOff x="0" y="0"/>
+          <a:chExt cx="0" cy="0"/>
+        </a:xfrm>
+      </p:grpSpPr>
+      <p:sp>
+        <p:nvSpPr>
+          <p:cNvPr id="2" name="Title 1">
+            <a:extLst>
+              <a:ext uri="{FF2B5EF4-FFF2-40B4-BE49-F238E27FC236}">
                 <a16:creationId xmlns:a16="http://schemas.microsoft.com/office/drawing/2014/main" id="{88E1C1A6-FE28-4763-B395-F7A572D92662}"/>
               </a:ext>
             </a:extLst>
@@ -7410,7 +7721,7 @@
 </p:sld>
 </file>
 
-<file path=ppt/slides/slide7.xml><?xml version="1.0" encoding="utf-8"?>
+<file path=ppt/slides/slide8.xml><?xml version="1.0" encoding="utf-8"?>
 <p:sld xmlns:a="http://schemas.openxmlformats.org/drawingml/2006/main" xmlns:r="http://schemas.openxmlformats.org/officeDocument/2006/relationships" xmlns:p="http://schemas.openxmlformats.org/presentationml/2006/main">
   <p:cSld>
     <p:spTree>
@@ -7604,7 +7915,7 @@
 </p:sld>
 </file>
 
-<file path=ppt/slides/slide8.xml><?xml version="1.0" encoding="utf-8"?>
+<file path=ppt/slides/slide9.xml><?xml version="1.0" encoding="utf-8"?>
 <p:sld xmlns:a="http://schemas.openxmlformats.org/drawingml/2006/main" xmlns:r="http://schemas.openxmlformats.org/officeDocument/2006/relationships" xmlns:p="http://schemas.openxmlformats.org/presentationml/2006/main">
   <p:cSld>
     <p:spTree>
@@ -7789,154 +8100,6 @@
     <p:extLst>
       <p:ext uri="{BB962C8B-B14F-4D97-AF65-F5344CB8AC3E}">
         <p14:creationId xmlns:p14="http://schemas.microsoft.com/office/powerpoint/2010/main" val="2542332510"/>
-      </p:ext>
-    </p:extLst>
-  </p:cSld>
-  <p:clrMapOvr>
-    <a:masterClrMapping/>
-  </p:clrMapOvr>
-</p:sld>
-</file>
-
-<file path=ppt/slides/slide9.xml><?xml version="1.0" encoding="utf-8"?>
-<p:sld xmlns:a="http://schemas.openxmlformats.org/drawingml/2006/main" xmlns:r="http://schemas.openxmlformats.org/officeDocument/2006/relationships" xmlns:p="http://schemas.openxmlformats.org/presentationml/2006/main">
-  <p:cSld>
-    <p:spTree>
-      <p:nvGrpSpPr>
-        <p:cNvPr id="1" name=""/>
-        <p:cNvGrpSpPr/>
-        <p:nvPr/>
-      </p:nvGrpSpPr>
-      <p:grpSpPr>
-        <a:xfrm>
-          <a:off x="0" y="0"/>
-          <a:ext cx="0" cy="0"/>
-          <a:chOff x="0" y="0"/>
-          <a:chExt cx="0" cy="0"/>
-        </a:xfrm>
-      </p:grpSpPr>
-      <p:sp>
-        <p:nvSpPr>
-          <p:cNvPr id="2" name="Title 1">
-            <a:extLst>
-              <a:ext uri="{FF2B5EF4-FFF2-40B4-BE49-F238E27FC236}">
-                <a16:creationId xmlns:a16="http://schemas.microsoft.com/office/drawing/2014/main" id="{E4B3FE24-EBF9-4E35-8F8A-299A89BD8301}"/>
-              </a:ext>
-            </a:extLst>
-          </p:cNvPr>
-          <p:cNvSpPr>
-            <a:spLocks noGrp="1"/>
-          </p:cNvSpPr>
-          <p:nvPr>
-            <p:ph type="title"/>
-          </p:nvPr>
-        </p:nvSpPr>
-        <p:spPr/>
-        <p:txBody>
-          <a:bodyPr/>
-          <a:lstStyle/>
-          <a:p>
-            <a:r>
-              <a:rPr lang="en-US" dirty="0"/>
-              <a:t>Double-constrained gravity model</a:t>
-            </a:r>
-            <a:endParaRPr lang="en-AT" dirty="0"/>
-          </a:p>
-        </p:txBody>
-      </p:sp>
-      <p:sp>
-        <p:nvSpPr>
-          <p:cNvPr id="3" name="Content Placeholder 2">
-            <a:extLst>
-              <a:ext uri="{FF2B5EF4-FFF2-40B4-BE49-F238E27FC236}">
-                <a16:creationId xmlns:a16="http://schemas.microsoft.com/office/drawing/2014/main" id="{5E2FFF4C-1657-48F9-BAA1-6F766DE29DB1}"/>
-              </a:ext>
-            </a:extLst>
-          </p:cNvPr>
-          <p:cNvSpPr>
-            <a:spLocks noGrp="1"/>
-          </p:cNvSpPr>
-          <p:nvPr>
-            <p:ph idx="1"/>
-          </p:nvPr>
-        </p:nvSpPr>
-        <p:spPr/>
-        <p:txBody>
-          <a:bodyPr/>
-          <a:lstStyle/>
-          <a:p>
-            <a:pPr marL="0" indent="0">
-              <a:buNone/>
-            </a:pPr>
-            <a:r>
-              <a:rPr lang="en-US" dirty="0"/>
-              <a:t>Solve trade flows based on:</a:t>
-            </a:r>
-          </a:p>
-          <a:p>
-            <a:pPr marL="0" indent="0">
-              <a:buNone/>
-            </a:pPr>
-            <a:r>
-              <a:rPr lang="en-US" dirty="0"/>
-              <a:t> </a:t>
-            </a:r>
-          </a:p>
-          <a:p>
-            <a:pPr marL="514350" indent="-514350">
-              <a:buAutoNum type="arabicParenR"/>
-            </a:pPr>
-            <a:r>
-              <a:rPr lang="en-US" dirty="0"/>
-              <a:t>Supply from region </a:t>
-            </a:r>
-            <a:r>
-              <a:rPr lang="en-US" b="1" dirty="0" err="1"/>
-              <a:t>i</a:t>
-            </a:r>
-            <a:endParaRPr lang="en-US" b="1" dirty="0"/>
-          </a:p>
-          <a:p>
-            <a:pPr marL="514350" indent="-514350">
-              <a:buAutoNum type="arabicParenR"/>
-            </a:pPr>
-            <a:r>
-              <a:rPr lang="en-US" dirty="0"/>
-              <a:t>Demand in region </a:t>
-            </a:r>
-            <a:r>
-              <a:rPr lang="en-US" b="1" dirty="0"/>
-              <a:t>j</a:t>
-            </a:r>
-          </a:p>
-          <a:p>
-            <a:pPr marL="514350" indent="-514350">
-              <a:buAutoNum type="arabicParenR"/>
-            </a:pPr>
-            <a:r>
-              <a:rPr lang="en-US" dirty="0"/>
-              <a:t>Distance between </a:t>
-            </a:r>
-            <a:r>
-              <a:rPr lang="en-US" b="1" dirty="0" err="1"/>
-              <a:t>i</a:t>
-            </a:r>
-            <a:r>
-              <a:rPr lang="en-US" dirty="0"/>
-              <a:t> and </a:t>
-            </a:r>
-            <a:r>
-              <a:rPr lang="en-US" b="1" dirty="0"/>
-              <a:t>j</a:t>
-            </a:r>
-            <a:endParaRPr lang="en-AT" dirty="0"/>
-          </a:p>
-        </p:txBody>
-      </p:sp>
-    </p:spTree>
-    <p:extLst>
-      <p:ext uri="{BB962C8B-B14F-4D97-AF65-F5344CB8AC3E}">
-        <p14:creationId xmlns:p14="http://schemas.microsoft.com/office/powerpoint/2010/main" val="2502605012"/>
       </p:ext>
     </p:extLst>
   </p:cSld>

</xml_diff>